<commit_message>
ajuste mapa da SE
</commit_message>
<xml_diff>
--- a/análise SE.pptx
+++ b/análise SE.pptx
@@ -10206,7 +10206,7 @@
         </p:spPr>
         <p:txBody>
           <a:bodyPr>
-            <a:normAutofit lnSpcReduction="10000"/>
+            <a:normAutofit/>
           </a:bodyPr>
           <a:lstStyle/>
           <a:p>
@@ -10280,49 +10280,21 @@
             </a:endParaRPr>
           </a:p>
           <a:p>
-            <a:r>
-              <a:rPr lang="pt-BR" sz="1800" b="0">
-                <a:solidFill>
-                  <a:schemeClr val="tx1"/>
-                </a:solidFill>
-              </a:rPr>
-              <a:t>Os </a:t>
-            </a:r>
+            <a:endParaRPr lang="pt-BR" sz="1800" b="0" dirty="0">
+              <a:solidFill>
+                <a:schemeClr val="tx1"/>
+              </a:solidFill>
+            </a:endParaRPr>
+          </a:p>
+          <a:p>
             <a:r>
               <a:rPr lang="pt-BR" sz="1800" b="0" dirty="0">
                 <a:solidFill>
                   <a:schemeClr val="tx1"/>
                 </a:solidFill>
               </a:rPr>
-              <a:t>erros encontrados não afetam no cadastro dos atributos;</a:t>
-            </a:r>
-          </a:p>
-          <a:p>
-            <a:r>
-              <a:rPr lang="pt-BR" sz="1800" b="0" dirty="0">
-                <a:solidFill>
-                  <a:schemeClr val="tx1"/>
-                </a:solidFill>
-              </a:rPr>
-              <a:t>O mesmo transformador pode ter mais de um erro no cadastro; </a:t>
-            </a:r>
-          </a:p>
-          <a:p>
-            <a:r>
-              <a:rPr lang="pt-BR" sz="1800" b="0" dirty="0">
-                <a:solidFill>
-                  <a:schemeClr val="tx1"/>
-                </a:solidFill>
-              </a:rPr>
-              <a:t>Fotos fora do padrão estabelecido.</a:t>
-            </a:r>
-          </a:p>
-          <a:p>
-            <a:endParaRPr lang="pt-BR" sz="1800" b="0" dirty="0">
-              <a:solidFill>
-                <a:schemeClr val="tx1"/>
-              </a:solidFill>
-            </a:endParaRPr>
+              <a:t>O transformador não está deslocado 4 quadras da SE.</a:t>
+            </a:r>
           </a:p>
           <a:p>
             <a:endParaRPr lang="es-ES_tradnl" sz="1800" b="0" dirty="0">
@@ -10393,10 +10365,10 @@
       </p:sp>
       <p:pic>
         <p:nvPicPr>
-          <p:cNvPr id="7" name="Imagem 6">
+          <p:cNvPr id="8" name="Imagem 7">
             <a:extLst>
               <a:ext uri="{FF2B5EF4-FFF2-40B4-BE49-F238E27FC236}">
-                <a16:creationId xmlns:a16="http://schemas.microsoft.com/office/drawing/2014/main" id="{FC571452-A9F1-7B9D-C3DF-77F7F3D44391}"/>
+                <a16:creationId xmlns:a16="http://schemas.microsoft.com/office/drawing/2014/main" id="{C94E0A3E-C2A1-2EE9-908A-FD811A354D4D}"/>
               </a:ext>
             </a:extLst>
           </p:cNvPr>
@@ -10413,86 +10385,14 @@
         </p:blipFill>
         <p:spPr>
           <a:xfrm>
-            <a:off x="957626" y="1289759"/>
-            <a:ext cx="4584589" cy="2743438"/>
+            <a:off x="1901898" y="927448"/>
+            <a:ext cx="8993335" cy="4292845"/>
           </a:xfrm>
           <a:prstGeom prst="rect">
             <a:avLst/>
           </a:prstGeom>
         </p:spPr>
       </p:pic>
-      <p:pic>
-        <p:nvPicPr>
-          <p:cNvPr id="9" name="Imagem 8">
-            <a:extLst>
-              <a:ext uri="{FF2B5EF4-FFF2-40B4-BE49-F238E27FC236}">
-                <a16:creationId xmlns:a16="http://schemas.microsoft.com/office/drawing/2014/main" id="{B2596D32-B035-33C2-9A17-6B85DFADFD13}"/>
-              </a:ext>
-            </a:extLst>
-          </p:cNvPr>
-          <p:cNvPicPr>
-            <a:picLocks noChangeAspect="1"/>
-          </p:cNvPicPr>
-          <p:nvPr/>
-        </p:nvPicPr>
-        <p:blipFill>
-          <a:blip r:embed="rId3"/>
-          <a:stretch>
-            <a:fillRect/>
-          </a:stretch>
-        </p:blipFill>
-        <p:spPr>
-          <a:xfrm>
-            <a:off x="7026936" y="1317333"/>
-            <a:ext cx="4590686" cy="2755631"/>
-          </a:xfrm>
-          <a:prstGeom prst="rect">
-            <a:avLst/>
-          </a:prstGeom>
-        </p:spPr>
-      </p:pic>
-      <p:cxnSp>
-        <p:nvCxnSpPr>
-          <p:cNvPr id="11" name="Conector: Curvo 10">
-            <a:extLst>
-              <a:ext uri="{FF2B5EF4-FFF2-40B4-BE49-F238E27FC236}">
-                <a16:creationId xmlns:a16="http://schemas.microsoft.com/office/drawing/2014/main" id="{818DBF56-8232-2C80-8030-452A36800BC8}"/>
-              </a:ext>
-            </a:extLst>
-          </p:cNvPr>
-          <p:cNvCxnSpPr/>
-          <p:nvPr/>
-        </p:nvCxnSpPr>
-        <p:spPr>
-          <a:xfrm flipV="1">
-            <a:off x="5661642" y="2397538"/>
-            <a:ext cx="1139868" cy="595223"/>
-          </a:xfrm>
-          <a:prstGeom prst="curvedConnector3">
-            <a:avLst/>
-          </a:prstGeom>
-          <a:ln>
-            <a:solidFill>
-              <a:srgbClr val="009FAE"/>
-            </a:solidFill>
-            <a:tailEnd type="triangle"/>
-          </a:ln>
-        </p:spPr>
-        <p:style>
-          <a:lnRef idx="1">
-            <a:schemeClr val="accent1"/>
-          </a:lnRef>
-          <a:fillRef idx="0">
-            <a:schemeClr val="accent1"/>
-          </a:fillRef>
-          <a:effectRef idx="0">
-            <a:schemeClr val="accent1"/>
-          </a:effectRef>
-          <a:fontRef idx="minor">
-            <a:schemeClr val="tx1"/>
-          </a:fontRef>
-        </p:style>
-      </p:cxnSp>
     </p:spTree>
     <p:extLst>
       <p:ext uri="{BB962C8B-B14F-4D97-AF65-F5344CB8AC3E}">
@@ -11688,26 +11588,6 @@
 </file>
 
 <file path=customXml/item1.xml><?xml version="1.0" encoding="utf-8"?>
-<p:properties xmlns:p="http://schemas.microsoft.com/office/2006/metadata/properties" xmlns:xsi="http://www.w3.org/2001/XMLSchema-instance" xmlns:pc="http://schemas.microsoft.com/office/infopath/2007/PartnerControls">
-  <documentManagement>
-    <lcf76f155ced4ddcb4097134ff3c332f xmlns="f74cdd9f-906e-4e7d-a87f-1ed05299a227">
-      <Terms xmlns="http://schemas.microsoft.com/office/infopath/2007/PartnerControls"/>
-    </lcf76f155ced4ddcb4097134ff3c332f>
-    <TaxCatchAll xmlns="312c8a7b-0d10-4575-9fde-b02817fb0a7a" xsi:nil="true"/>
-  </documentManagement>
-</p:properties>
-</file>
-
-<file path=customXml/item2.xml><?xml version="1.0" encoding="utf-8"?>
-<?mso-contentType ?>
-<FormTemplates xmlns="http://schemas.microsoft.com/sharepoint/v3/contenttype/forms">
-  <Display>DocumentLibraryForm</Display>
-  <Edit>DocumentLibraryForm</Edit>
-  <New>DocumentLibraryForm</New>
-</FormTemplates>
-</file>
-
-<file path=customXml/item3.xml><?xml version="1.0" encoding="utf-8"?>
 <ct:contentTypeSchema xmlns:ct="http://schemas.microsoft.com/office/2006/metadata/contentType" xmlns:ma="http://schemas.microsoft.com/office/2006/metadata/properties/metaAttributes" ct:_="" ma:_="" ma:contentTypeName="Document" ma:contentTypeID="0x010100259C91C59AAA3C40B8C3F8291AEB470B" ma:contentTypeVersion="14" ma:contentTypeDescription="Create a new document." ma:contentTypeScope="" ma:versionID="5bceb1779332459bd0371df391aaabb1">
   <xsd:schema xmlns:xsd="http://www.w3.org/2001/XMLSchema" xmlns:xs="http://www.w3.org/2001/XMLSchema" xmlns:p="http://schemas.microsoft.com/office/2006/metadata/properties" xmlns:ns2="f74cdd9f-906e-4e7d-a87f-1ed05299a227" xmlns:ns3="312c8a7b-0d10-4575-9fde-b02817fb0a7a" targetNamespace="http://schemas.microsoft.com/office/2006/metadata/properties" ma:root="true" ma:fieldsID="f3645a025343f085b05f094ab736786c" ns2:_="" ns3:_="">
     <xsd:import namespace="f74cdd9f-906e-4e7d-a87f-1ed05299a227"/>
@@ -11936,27 +11816,27 @@
 </ct:contentTypeSchema>
 </file>
 
-<file path=customXml/itemProps1.xml><?xml version="1.0" encoding="utf-8"?>
-<ds:datastoreItem xmlns:ds="http://schemas.openxmlformats.org/officeDocument/2006/customXml" ds:itemID="{A26BACCF-6D5B-4E65-B499-C5286275A2BD}">
-  <ds:schemaRefs>
-    <ds:schemaRef ds:uri="http://schemas.microsoft.com/office/2006/metadata/properties"/>
-    <ds:schemaRef ds:uri="http://schemas.microsoft.com/office/infopath/2007/PartnerControls"/>
-    <ds:schemaRef ds:uri="bec0ef55-c12b-4370-b19d-e989ab63482b"/>
-    <ds:schemaRef ds:uri="f74cdd9f-906e-4e7d-a87f-1ed05299a227"/>
-    <ds:schemaRef ds:uri="312c8a7b-0d10-4575-9fde-b02817fb0a7a"/>
-  </ds:schemaRefs>
-</ds:datastoreItem>
+<file path=customXml/item2.xml><?xml version="1.0" encoding="utf-8"?>
+<?mso-contentType ?>
+<FormTemplates xmlns="http://schemas.microsoft.com/sharepoint/v3/contenttype/forms">
+  <Display>DocumentLibraryForm</Display>
+  <Edit>DocumentLibraryForm</Edit>
+  <New>DocumentLibraryForm</New>
+</FormTemplates>
 </file>
 
-<file path=customXml/itemProps2.xml><?xml version="1.0" encoding="utf-8"?>
-<ds:datastoreItem xmlns:ds="http://schemas.openxmlformats.org/officeDocument/2006/customXml" ds:itemID="{ACE3D08C-80E8-4AF8-9E39-B9FDF3CCEA5A}">
-  <ds:schemaRefs>
-    <ds:schemaRef ds:uri="http://schemas.microsoft.com/sharepoint/v3/contenttype/forms"/>
-  </ds:schemaRefs>
-</ds:datastoreItem>
+<file path=customXml/item3.xml><?xml version="1.0" encoding="utf-8"?>
+<p:properties xmlns:p="http://schemas.microsoft.com/office/2006/metadata/properties" xmlns:xsi="http://www.w3.org/2001/XMLSchema-instance" xmlns:pc="http://schemas.microsoft.com/office/infopath/2007/PartnerControls">
+  <documentManagement>
+    <lcf76f155ced4ddcb4097134ff3c332f xmlns="f74cdd9f-906e-4e7d-a87f-1ed05299a227">
+      <Terms xmlns="http://schemas.microsoft.com/office/infopath/2007/PartnerControls"/>
+    </lcf76f155ced4ddcb4097134ff3c332f>
+    <TaxCatchAll xmlns="312c8a7b-0d10-4575-9fde-b02817fb0a7a" xsi:nil="true"/>
+  </documentManagement>
+</p:properties>
 </file>
 
-<file path=customXml/itemProps3.xml><?xml version="1.0" encoding="utf-8"?>
+<file path=customXml/itemProps1.xml><?xml version="1.0" encoding="utf-8"?>
 <ds:datastoreItem xmlns:ds="http://schemas.openxmlformats.org/officeDocument/2006/customXml" ds:itemID="{728CF751-BD33-4CF9-9CD4-8CEAF3A8909D}">
   <ds:schemaRefs>
     <ds:schemaRef ds:uri="http://schemas.microsoft.com/office/2006/metadata/contentType"/>
@@ -11973,4 +11853,24 @@
     <ds:schemaRef ds:uri="http://schemas.microsoft.com/internal/obd"/>
   </ds:schemaRefs>
 </ds:datastoreItem>
+</file>
+
+<file path=customXml/itemProps2.xml><?xml version="1.0" encoding="utf-8"?>
+<ds:datastoreItem xmlns:ds="http://schemas.openxmlformats.org/officeDocument/2006/customXml" ds:itemID="{ACE3D08C-80E8-4AF8-9E39-B9FDF3CCEA5A}">
+  <ds:schemaRefs>
+    <ds:schemaRef ds:uri="http://schemas.microsoft.com/sharepoint/v3/contenttype/forms"/>
+  </ds:schemaRefs>
+</ds:datastoreItem>
+</file>
+
+<file path=customXml/itemProps3.xml><?xml version="1.0" encoding="utf-8"?>
+<ds:datastoreItem xmlns:ds="http://schemas.openxmlformats.org/officeDocument/2006/customXml" ds:itemID="{A26BACCF-6D5B-4E65-B499-C5286275A2BD}">
+  <ds:schemaRefs>
+    <ds:schemaRef ds:uri="http://schemas.microsoft.com/office/2006/metadata/properties"/>
+    <ds:schemaRef ds:uri="http://schemas.microsoft.com/office/infopath/2007/PartnerControls"/>
+    <ds:schemaRef ds:uri="bec0ef55-c12b-4370-b19d-e989ab63482b"/>
+    <ds:schemaRef ds:uri="f74cdd9f-906e-4e7d-a87f-1ed05299a227"/>
+    <ds:schemaRef ds:uri="312c8a7b-0d10-4575-9fde-b02817fb0a7a"/>
+  </ds:schemaRefs>
+</ds:datastoreItem>
 </file>
</xml_diff>